<commit_message>
Added link to Microsoft Imagine
</commit_message>
<xml_diff>
--- a/lectures/2018-01-16 introduction/2018-01-16 introduction.pptx
+++ b/lectures/2018-01-16 introduction/2018-01-16 introduction.pptx
@@ -5,7 +5,7 @@
     <p:sldMasterId id="2147483660" r:id="rId1"/>
   </p:sldMasterIdLst>
   <p:notesMasterIdLst>
-    <p:notesMasterId r:id="rId16"/>
+    <p:notesMasterId r:id="rId17"/>
   </p:notesMasterIdLst>
   <p:sldIdLst>
     <p:sldId id="256" r:id="rId2"/>
@@ -22,6 +22,7 @@
     <p:sldId id="262" r:id="rId13"/>
     <p:sldId id="267" r:id="rId14"/>
     <p:sldId id="268" r:id="rId15"/>
+    <p:sldId id="270" r:id="rId16"/>
   </p:sldIdLst>
   <p:sldSz cx="12192000" cy="6858000"/>
   <p:notesSz cx="6858000" cy="9144000"/>
@@ -3483,6 +3484,13 @@
   <p:clrMapOvr>
     <a:masterClrMapping/>
   </p:clrMapOvr>
+  <p:timing>
+    <p:tnLst>
+      <p:par>
+        <p:cTn id="1" dur="indefinite" restart="never" nodeType="tmRoot"/>
+      </p:par>
+    </p:tnLst>
+  </p:timing>
 </p:sld>
 </file>
 
@@ -3563,6 +3571,13 @@
   <p:clrMapOvr>
     <a:masterClrMapping/>
   </p:clrMapOvr>
+  <p:timing>
+    <p:tnLst>
+      <p:par>
+        <p:cTn id="1" dur="indefinite" restart="never" nodeType="tmRoot"/>
+      </p:par>
+    </p:tnLst>
+  </p:timing>
 </p:sld>
 </file>
 
@@ -3666,6 +3681,13 @@
   <p:clrMapOvr>
     <a:masterClrMapping/>
   </p:clrMapOvr>
+  <p:timing>
+    <p:tnLst>
+      <p:par>
+        <p:cTn id="1" dur="indefinite" restart="never" nodeType="tmRoot"/>
+      </p:par>
+    </p:tnLst>
+  </p:timing>
 </p:sld>
 </file>
 
@@ -4566,6 +4588,13 @@
   <p:clrMapOvr>
     <a:masterClrMapping/>
   </p:clrMapOvr>
+  <p:timing>
+    <p:tnLst>
+      <p:par>
+        <p:cTn id="1" dur="indefinite" restart="never" nodeType="tmRoot"/>
+      </p:par>
+    </p:tnLst>
+  </p:timing>
 </p:sld>
 </file>
 
@@ -4693,6 +4722,13 @@
   <p:clrMapOvr>
     <a:masterClrMapping/>
   </p:clrMapOvr>
+  <p:timing>
+    <p:tnLst>
+      <p:par>
+        <p:cTn id="1" dur="indefinite" restart="never" nodeType="tmRoot"/>
+      </p:par>
+    </p:tnLst>
+  </p:timing>
 </p:sld>
 </file>
 
@@ -4753,6 +4789,194 @@
   <p:clrMapOvr>
     <a:masterClrMapping/>
   </p:clrMapOvr>
+  <p:timing>
+    <p:tnLst>
+      <p:par>
+        <p:cTn id="1" dur="indefinite" restart="never" nodeType="tmRoot"/>
+      </p:par>
+    </p:tnLst>
+  </p:timing>
+</p:sld>
+</file>
+
+<file path=ppt/slides/slide15.xml><?xml version="1.0" encoding="utf-8"?>
+<p:sld xmlns:a="http://schemas.openxmlformats.org/drawingml/2006/main" xmlns:r="http://schemas.openxmlformats.org/officeDocument/2006/relationships" xmlns:p="http://schemas.openxmlformats.org/presentationml/2006/main">
+  <p:cSld>
+    <p:spTree>
+      <p:nvGrpSpPr>
+        <p:cNvPr id="1" name=""/>
+        <p:cNvGrpSpPr/>
+        <p:nvPr/>
+      </p:nvGrpSpPr>
+      <p:grpSpPr>
+        <a:xfrm>
+          <a:off x="0" y="0"/>
+          <a:ext cx="0" cy="0"/>
+          <a:chOff x="0" y="0"/>
+          <a:chExt cx="0" cy="0"/>
+        </a:xfrm>
+      </p:grpSpPr>
+      <p:sp>
+        <p:nvSpPr>
+          <p:cNvPr id="2" name="Title 1"/>
+          <p:cNvSpPr>
+            <a:spLocks noGrp="1"/>
+          </p:cNvSpPr>
+          <p:nvPr>
+            <p:ph type="title"/>
+          </p:nvPr>
+        </p:nvSpPr>
+        <p:spPr/>
+        <p:txBody>
+          <a:bodyPr/>
+          <a:lstStyle/>
+          <a:p>
+            <a:r>
+              <a:rPr lang="en-US" dirty="0" smtClean="0"/>
+              <a:t>A more fun comment</a:t>
+            </a:r>
+            <a:endParaRPr lang="en-US" dirty="0"/>
+          </a:p>
+        </p:txBody>
+      </p:sp>
+      <p:sp>
+        <p:nvSpPr>
+          <p:cNvPr id="3" name="Content Placeholder 2"/>
+          <p:cNvSpPr>
+            <a:spLocks noGrp="1"/>
+          </p:cNvSpPr>
+          <p:nvPr>
+            <p:ph idx="1"/>
+          </p:nvPr>
+        </p:nvSpPr>
+        <p:spPr/>
+        <p:txBody>
+          <a:bodyPr/>
+          <a:lstStyle/>
+          <a:p>
+            <a:r>
+              <a:rPr lang="en-US" dirty="0" smtClean="0"/>
+              <a:t>Some days Adam </a:t>
+            </a:r>
+            <a:r>
+              <a:rPr lang="en-US" dirty="0"/>
+              <a:t>will seem like he's in a great mood and his lectures will get like 5x better. not a complaint, we can't all be happy-go-lucky all the time, but just something </a:t>
+            </a:r>
+            <a:r>
+              <a:rPr lang="en-US" dirty="0" err="1"/>
+              <a:t>i</a:t>
+            </a:r>
+            <a:r>
+              <a:rPr lang="en-US" dirty="0"/>
+              <a:t> noticed. </a:t>
+            </a:r>
+          </a:p>
+        </p:txBody>
+      </p:sp>
+    </p:spTree>
+    <p:extLst>
+      <p:ext uri="{BB962C8B-B14F-4D97-AF65-F5344CB8AC3E}">
+        <p14:creationId xmlns:p14="http://schemas.microsoft.com/office/powerpoint/2010/main" val="2046638224"/>
+      </p:ext>
+    </p:extLst>
+  </p:cSld>
+  <p:clrMapOvr>
+    <a:masterClrMapping/>
+  </p:clrMapOvr>
+  <p:timing>
+    <p:tnLst>
+      <p:par>
+        <p:cTn id="1" dur="indefinite" restart="never" nodeType="tmRoot">
+          <p:childTnLst>
+            <p:seq concurrent="1" nextAc="seek">
+              <p:cTn id="2" dur="indefinite" nodeType="mainSeq">
+                <p:childTnLst>
+                  <p:par>
+                    <p:cTn id="3" fill="hold">
+                      <p:stCondLst>
+                        <p:cond delay="indefinite"/>
+                      </p:stCondLst>
+                      <p:childTnLst>
+                        <p:par>
+                          <p:cTn id="4" fill="hold">
+                            <p:stCondLst>
+                              <p:cond delay="0"/>
+                            </p:stCondLst>
+                            <p:childTnLst>
+                              <p:par>
+                                <p:cTn id="5" presetID="10" presetClass="entr" presetSubtype="0" fill="hold" grpId="0" nodeType="clickEffect">
+                                  <p:stCondLst>
+                                    <p:cond delay="0"/>
+                                  </p:stCondLst>
+                                  <p:childTnLst>
+                                    <p:set>
+                                      <p:cBhvr>
+                                        <p:cTn id="6" dur="1" fill="hold">
+                                          <p:stCondLst>
+                                            <p:cond delay="0"/>
+                                          </p:stCondLst>
+                                        </p:cTn>
+                                        <p:tgtEl>
+                                          <p:spTgt spid="3">
+                                            <p:txEl>
+                                              <p:pRg st="0" end="0"/>
+                                            </p:txEl>
+                                          </p:spTgt>
+                                        </p:tgtEl>
+                                        <p:attrNameLst>
+                                          <p:attrName>style.visibility</p:attrName>
+                                        </p:attrNameLst>
+                                      </p:cBhvr>
+                                      <p:to>
+                                        <p:strVal val="visible"/>
+                                      </p:to>
+                                    </p:set>
+                                    <p:animEffect transition="in" filter="fade">
+                                      <p:cBhvr>
+                                        <p:cTn id="7" dur="500"/>
+                                        <p:tgtEl>
+                                          <p:spTgt spid="3">
+                                            <p:txEl>
+                                              <p:pRg st="0" end="0"/>
+                                            </p:txEl>
+                                          </p:spTgt>
+                                        </p:tgtEl>
+                                      </p:cBhvr>
+                                    </p:animEffect>
+                                  </p:childTnLst>
+                                </p:cTn>
+                              </p:par>
+                            </p:childTnLst>
+                          </p:cTn>
+                        </p:par>
+                      </p:childTnLst>
+                    </p:cTn>
+                  </p:par>
+                </p:childTnLst>
+              </p:cTn>
+              <p:prevCondLst>
+                <p:cond evt="onPrev" delay="0">
+                  <p:tgtEl>
+                    <p:sldTgt/>
+                  </p:tgtEl>
+                </p:cond>
+              </p:prevCondLst>
+              <p:nextCondLst>
+                <p:cond evt="onNext" delay="0">
+                  <p:tgtEl>
+                    <p:sldTgt/>
+                  </p:tgtEl>
+                </p:cond>
+              </p:nextCondLst>
+            </p:seq>
+          </p:childTnLst>
+        </p:cTn>
+      </p:par>
+    </p:tnLst>
+    <p:bldLst>
+      <p:bldP spid="3" grpId="0" build="p"/>
+    </p:bldLst>
+  </p:timing>
 </p:sld>
 </file>
 
@@ -5174,6 +5398,13 @@
   <p:clrMapOvr>
     <a:masterClrMapping/>
   </p:clrMapOvr>
+  <p:timing>
+    <p:tnLst>
+      <p:par>
+        <p:cTn id="1" dur="indefinite" restart="never" nodeType="tmRoot"/>
+      </p:par>
+    </p:tnLst>
+  </p:timing>
 </p:sld>
 </file>
 
@@ -5256,6 +5487,13 @@
   <p:clrMapOvr>
     <a:masterClrMapping/>
   </p:clrMapOvr>
+  <p:timing>
+    <p:tnLst>
+      <p:par>
+        <p:cTn id="1" dur="indefinite" restart="never" nodeType="tmRoot"/>
+      </p:par>
+    </p:tnLst>
+  </p:timing>
 </p:sld>
 </file>
 
@@ -5330,6 +5568,13 @@
   <p:clrMapOvr>
     <a:masterClrMapping/>
   </p:clrMapOvr>
+  <p:timing>
+    <p:tnLst>
+      <p:par>
+        <p:cTn id="1" dur="indefinite" restart="never" nodeType="tmRoot"/>
+      </p:par>
+    </p:tnLst>
+  </p:timing>
 </p:sld>
 </file>
 
@@ -5414,6 +5659,13 @@
   <p:clrMapOvr>
     <a:masterClrMapping/>
   </p:clrMapOvr>
+  <p:timing>
+    <p:tnLst>
+      <p:par>
+        <p:cTn id="1" dur="indefinite" restart="never" nodeType="tmRoot"/>
+      </p:par>
+    </p:tnLst>
+  </p:timing>
 </p:sld>
 </file>
 
@@ -5897,8 +6149,14 @@
           <a:p>
             <a:pPr lvl="1"/>
             <a:r>
+              <a:rPr lang="en-US" dirty="0">
+                <a:hlinkClick r:id="rId2"/>
+              </a:rPr>
+              <a:t>Visual Studio 2017 </a:t>
+            </a:r>
+            <a:r>
               <a:rPr lang="en-US" dirty="0"/>
-              <a:t>Visual Studio 2017 with Clang support (requires extra plugin)</a:t>
+              <a:t>with Clang support (requires extra plugin)</a:t>
             </a:r>
           </a:p>
           <a:p>
@@ -6355,6 +6613,13 @@
   <p:clrMapOvr>
     <a:masterClrMapping/>
   </p:clrMapOvr>
+  <p:timing>
+    <p:tnLst>
+      <p:par>
+        <p:cTn id="1" dur="indefinite" restart="never" nodeType="tmRoot"/>
+      </p:par>
+    </p:tnLst>
+  </p:timing>
 </p:sld>
 </file>
 

</xml_diff>

<commit_message>
updated office hours in syllabus and intro slides
</commit_message>
<xml_diff>
--- a/lectures/2018-01-16 introduction/2018-01-16 introduction.pptx
+++ b/lectures/2018-01-16 introduction/2018-01-16 introduction.pptx
@@ -215,7 +215,7 @@
           <a:p>
             <a:fld id="{72D5C19B-83A8-4A25-B308-A328675A92FC}" type="datetimeFigureOut">
               <a:rPr lang="en-US" smtClean="0"/>
-              <a:t>1/16/2018</a:t>
+              <a:t>1/18/2018</a:t>
             </a:fld>
             <a:endParaRPr lang="en-US"/>
           </a:p>
@@ -705,7 +705,7 @@
           <a:p>
             <a:fld id="{5C169494-A7F3-4812-ADAA-B429089E3BC2}" type="datetimeFigureOut">
               <a:rPr lang="en-US" smtClean="0"/>
-              <a:t>1/16/2018</a:t>
+              <a:t>1/18/2018</a:t>
             </a:fld>
             <a:endParaRPr lang="en-US"/>
           </a:p>
@@ -875,7 +875,7 @@
           <a:p>
             <a:fld id="{5C169494-A7F3-4812-ADAA-B429089E3BC2}" type="datetimeFigureOut">
               <a:rPr lang="en-US" smtClean="0"/>
-              <a:t>1/16/2018</a:t>
+              <a:t>1/18/2018</a:t>
             </a:fld>
             <a:endParaRPr lang="en-US"/>
           </a:p>
@@ -1055,7 +1055,7 @@
           <a:p>
             <a:fld id="{5C169494-A7F3-4812-ADAA-B429089E3BC2}" type="datetimeFigureOut">
               <a:rPr lang="en-US" smtClean="0"/>
-              <a:t>1/16/2018</a:t>
+              <a:t>1/18/2018</a:t>
             </a:fld>
             <a:endParaRPr lang="en-US"/>
           </a:p>
@@ -1225,7 +1225,7 @@
           <a:p>
             <a:fld id="{5C169494-A7F3-4812-ADAA-B429089E3BC2}" type="datetimeFigureOut">
               <a:rPr lang="en-US" smtClean="0"/>
-              <a:t>1/16/2018</a:t>
+              <a:t>1/18/2018</a:t>
             </a:fld>
             <a:endParaRPr lang="en-US"/>
           </a:p>
@@ -1469,7 +1469,7 @@
           <a:p>
             <a:fld id="{5C169494-A7F3-4812-ADAA-B429089E3BC2}" type="datetimeFigureOut">
               <a:rPr lang="en-US" smtClean="0"/>
-              <a:t>1/16/2018</a:t>
+              <a:t>1/18/2018</a:t>
             </a:fld>
             <a:endParaRPr lang="en-US"/>
           </a:p>
@@ -1701,7 +1701,7 @@
           <a:p>
             <a:fld id="{5C169494-A7F3-4812-ADAA-B429089E3BC2}" type="datetimeFigureOut">
               <a:rPr lang="en-US" smtClean="0"/>
-              <a:t>1/16/2018</a:t>
+              <a:t>1/18/2018</a:t>
             </a:fld>
             <a:endParaRPr lang="en-US"/>
           </a:p>
@@ -2068,7 +2068,7 @@
           <a:p>
             <a:fld id="{5C169494-A7F3-4812-ADAA-B429089E3BC2}" type="datetimeFigureOut">
               <a:rPr lang="en-US" smtClean="0"/>
-              <a:t>1/16/2018</a:t>
+              <a:t>1/18/2018</a:t>
             </a:fld>
             <a:endParaRPr lang="en-US"/>
           </a:p>
@@ -2186,7 +2186,7 @@
           <a:p>
             <a:fld id="{5C169494-A7F3-4812-ADAA-B429089E3BC2}" type="datetimeFigureOut">
               <a:rPr lang="en-US" smtClean="0"/>
-              <a:t>1/16/2018</a:t>
+              <a:t>1/18/2018</a:t>
             </a:fld>
             <a:endParaRPr lang="en-US"/>
           </a:p>
@@ -2281,7 +2281,7 @@
           <a:p>
             <a:fld id="{5C169494-A7F3-4812-ADAA-B429089E3BC2}" type="datetimeFigureOut">
               <a:rPr lang="en-US" smtClean="0"/>
-              <a:t>1/16/2018</a:t>
+              <a:t>1/18/2018</a:t>
             </a:fld>
             <a:endParaRPr lang="en-US"/>
           </a:p>
@@ -2558,7 +2558,7 @@
           <a:p>
             <a:fld id="{5C169494-A7F3-4812-ADAA-B429089E3BC2}" type="datetimeFigureOut">
               <a:rPr lang="en-US" smtClean="0"/>
-              <a:t>1/16/2018</a:t>
+              <a:t>1/18/2018</a:t>
             </a:fld>
             <a:endParaRPr lang="en-US"/>
           </a:p>
@@ -2815,7 +2815,7 @@
           <a:p>
             <a:fld id="{5C169494-A7F3-4812-ADAA-B429089E3BC2}" type="datetimeFigureOut">
               <a:rPr lang="en-US" smtClean="0"/>
-              <a:t>1/16/2018</a:t>
+              <a:t>1/18/2018</a:t>
             </a:fld>
             <a:endParaRPr lang="en-US"/>
           </a:p>
@@ -3028,7 +3028,7 @@
           <a:p>
             <a:fld id="{5C169494-A7F3-4812-ADAA-B429089E3BC2}" type="datetimeFigureOut">
               <a:rPr lang="en-US" smtClean="0"/>
-              <a:t>1/16/2018</a:t>
+              <a:t>1/18/2018</a:t>
             </a:fld>
             <a:endParaRPr lang="en-US"/>
           </a:p>
@@ -5619,13 +5619,7 @@
       </p:sp>
       <p:pic>
         <p:nvPicPr>
-          <p:cNvPr id="5" name="Content Placeholder 4">
-            <a:extLst>
-              <a:ext uri="{FF2B5EF4-FFF2-40B4-BE49-F238E27FC236}">
-                <a16:creationId xmlns:a16="http://schemas.microsoft.com/office/drawing/2014/main" id="{8BC85005-430E-461F-B563-E17EBB6026F1}"/>
-              </a:ext>
-            </a:extLst>
-          </p:cNvPr>
+          <p:cNvPr id="6" name="Content Placeholder 5"/>
           <p:cNvPicPr>
             <a:picLocks noGrp="1" noChangeAspect="1"/>
           </p:cNvPicPr>
@@ -5641,8 +5635,8 @@
         </p:blipFill>
         <p:spPr>
           <a:xfrm>
-            <a:off x="2471422" y="1236492"/>
-            <a:ext cx="8328926" cy="5621508"/>
+            <a:off x="510493" y="1593273"/>
+            <a:ext cx="11171013" cy="4537113"/>
           </a:xfrm>
           <a:prstGeom prst="rect">
             <a:avLst/>

</xml_diff>